<commit_message>
CISC 848 Presentation - Ready for delivery
</commit_message>
<xml_diff>
--- a/CISC848/Implementation/Presentation/CvssEquationRecasting.pptx
+++ b/CISC848/Implementation/Presentation/CvssEquationRecasting.pptx
@@ -5,7 +5,7 @@
     <p:sldMasterId id="2147483696" r:id="rId1"/>
   </p:sldMasterIdLst>
   <p:notesMasterIdLst>
-    <p:notesMasterId r:id="rId29"/>
+    <p:notesMasterId r:id="rId28"/>
   </p:notesMasterIdLst>
   <p:sldIdLst>
     <p:sldId id="256" r:id="rId2"/>
@@ -17,24 +17,23 @@
     <p:sldId id="263" r:id="rId8"/>
     <p:sldId id="286" r:id="rId9"/>
     <p:sldId id="265" r:id="rId10"/>
-    <p:sldId id="267" r:id="rId11"/>
-    <p:sldId id="269" r:id="rId12"/>
-    <p:sldId id="280" r:id="rId13"/>
-    <p:sldId id="270" r:id="rId14"/>
-    <p:sldId id="271" r:id="rId15"/>
-    <p:sldId id="273" r:id="rId16"/>
-    <p:sldId id="274" r:id="rId17"/>
-    <p:sldId id="275" r:id="rId18"/>
-    <p:sldId id="276" r:id="rId19"/>
-    <p:sldId id="277" r:id="rId20"/>
-    <p:sldId id="278" r:id="rId21"/>
-    <p:sldId id="279" r:id="rId22"/>
-    <p:sldId id="282" r:id="rId23"/>
-    <p:sldId id="281" r:id="rId24"/>
-    <p:sldId id="283" r:id="rId25"/>
-    <p:sldId id="284" r:id="rId26"/>
-    <p:sldId id="285" r:id="rId27"/>
-    <p:sldId id="266" r:id="rId28"/>
+    <p:sldId id="269" r:id="rId11"/>
+    <p:sldId id="280" r:id="rId12"/>
+    <p:sldId id="270" r:id="rId13"/>
+    <p:sldId id="271" r:id="rId14"/>
+    <p:sldId id="273" r:id="rId15"/>
+    <p:sldId id="274" r:id="rId16"/>
+    <p:sldId id="275" r:id="rId17"/>
+    <p:sldId id="276" r:id="rId18"/>
+    <p:sldId id="277" r:id="rId19"/>
+    <p:sldId id="278" r:id="rId20"/>
+    <p:sldId id="279" r:id="rId21"/>
+    <p:sldId id="282" r:id="rId22"/>
+    <p:sldId id="281" r:id="rId23"/>
+    <p:sldId id="283" r:id="rId24"/>
+    <p:sldId id="284" r:id="rId25"/>
+    <p:sldId id="285" r:id="rId26"/>
+    <p:sldId id="266" r:id="rId27"/>
   </p:sldIdLst>
   <p:sldSz cx="12192000" cy="6858000"/>
   <p:notesSz cx="6858000" cy="9144000"/>
@@ -556,7 +555,7 @@
           <a:p>
             <a:fld id="{0AB3370E-83B4-4864-B523-9AC079E4A65D}" type="slidenum">
               <a:rPr lang="en-CA" smtClean="0"/>
-              <a:t>18</a:t>
+              <a:t>17</a:t>
             </a:fld>
             <a:endParaRPr lang="en-CA"/>
           </a:p>
@@ -6624,15 +6623,7 @@
           <a:p>
             <a:r>
               <a:rPr lang="en-US" sz="5800" dirty="0" smtClean="0"/>
-              <a:t>Improved exploit prediction with </a:t>
-            </a:r>
-            <a:r>
-              <a:rPr lang="en-US" sz="5800" dirty="0" smtClean="0"/>
-              <a:t>optimized CVSS </a:t>
-            </a:r>
-            <a:r>
-              <a:rPr lang="en-US" sz="5800" dirty="0" smtClean="0"/>
-              <a:t>equation</a:t>
+              <a:t>Improved exploit prediction with optimized CVSS equation</a:t>
             </a:r>
             <a:endParaRPr lang="en-CA" sz="5800" dirty="0"/>
           </a:p>
@@ -6673,6 +6664,13 @@
   <p:clrMapOvr>
     <a:masterClrMapping/>
   </p:clrMapOvr>
+  <p:timing>
+    <p:tnLst>
+      <p:par>
+        <p:cTn id="1" dur="indefinite" restart="never" nodeType="tmRoot"/>
+      </p:par>
+    </p:tnLst>
+  </p:timing>
 </p:sld>
 </file>
 
@@ -6717,114 +6715,6 @@
           <a:p>
             <a:r>
               <a:rPr lang="en-US" sz="6000" dirty="0" smtClean="0"/>
-              <a:t>Intro – CVSS Issues</a:t>
-            </a:r>
-            <a:endParaRPr lang="en-CA" dirty="0"/>
-          </a:p>
-        </p:txBody>
-      </p:sp>
-      <p:sp>
-        <p:nvSpPr>
-          <p:cNvPr id="3" name="Content Placeholder 2"/>
-          <p:cNvSpPr>
-            <a:spLocks noGrp="1"/>
-          </p:cNvSpPr>
-          <p:nvPr>
-            <p:ph idx="1"/>
-          </p:nvPr>
-        </p:nvSpPr>
-        <p:spPr>
-          <a:xfrm>
-            <a:off x="1484308" y="1314994"/>
-            <a:ext cx="8826641" cy="4981303"/>
-          </a:xfrm>
-        </p:spPr>
-        <p:txBody>
-          <a:bodyPr anchor="ctr">
-            <a:normAutofit/>
-          </a:bodyPr>
-          <a:lstStyle/>
-          <a:p>
-            <a:r>
-              <a:rPr lang="en-US" sz="3600" dirty="0" smtClean="0"/>
-              <a:t>Inability to reflect risk </a:t>
-            </a:r>
-            <a:r>
-              <a:rPr lang="en-US" sz="3600" dirty="0" smtClean="0"/>
-              <a:t>necessitates specific </a:t>
-            </a:r>
-            <a:r>
-              <a:rPr lang="en-US" sz="3600" dirty="0" smtClean="0"/>
-              <a:t>systems </a:t>
-            </a:r>
-            <a:r>
-              <a:rPr lang="en-US" sz="3600" dirty="0" smtClean="0"/>
-              <a:t>[5]</a:t>
-            </a:r>
-            <a:endParaRPr lang="en-US" sz="3600" dirty="0" smtClean="0"/>
-          </a:p>
-          <a:p>
-            <a:r>
-              <a:rPr lang="en-US" sz="3600" dirty="0" smtClean="0"/>
-              <a:t>Specific systems undermine standardization</a:t>
-            </a:r>
-          </a:p>
-        </p:txBody>
-      </p:sp>
-    </p:spTree>
-    <p:extLst>
-      <p:ext uri="{BB962C8B-B14F-4D97-AF65-F5344CB8AC3E}">
-        <p14:creationId xmlns:p14="http://schemas.microsoft.com/office/powerpoint/2010/main" val="1787024987"/>
-      </p:ext>
-    </p:extLst>
-  </p:cSld>
-  <p:clrMapOvr>
-    <a:masterClrMapping/>
-  </p:clrMapOvr>
-</p:sld>
-</file>
-
-<file path=ppt/slides/slide11.xml><?xml version="1.0" encoding="utf-8"?>
-<p:sld xmlns:a="http://schemas.openxmlformats.org/drawingml/2006/main" xmlns:r="http://schemas.openxmlformats.org/officeDocument/2006/relationships" xmlns:p="http://schemas.openxmlformats.org/presentationml/2006/main">
-  <p:cSld>
-    <p:spTree>
-      <p:nvGrpSpPr>
-        <p:cNvPr id="1" name=""/>
-        <p:cNvGrpSpPr/>
-        <p:nvPr/>
-      </p:nvGrpSpPr>
-      <p:grpSpPr>
-        <a:xfrm>
-          <a:off x="0" y="0"/>
-          <a:ext cx="0" cy="0"/>
-          <a:chOff x="0" y="0"/>
-          <a:chExt cx="0" cy="0"/>
-        </a:xfrm>
-      </p:grpSpPr>
-      <p:sp>
-        <p:nvSpPr>
-          <p:cNvPr id="2" name="Title 1"/>
-          <p:cNvSpPr>
-            <a:spLocks noGrp="1"/>
-          </p:cNvSpPr>
-          <p:nvPr>
-            <p:ph type="title"/>
-          </p:nvPr>
-        </p:nvSpPr>
-        <p:spPr>
-          <a:xfrm>
-            <a:off x="1484309" y="267788"/>
-            <a:ext cx="10018713" cy="1047206"/>
-          </a:xfrm>
-        </p:spPr>
-        <p:txBody>
-          <a:bodyPr>
-            <a:normAutofit/>
-          </a:bodyPr>
-          <a:lstStyle/>
-          <a:p>
-            <a:r>
-              <a:rPr lang="en-US" sz="6000" dirty="0" smtClean="0"/>
               <a:t>Contribution</a:t>
             </a:r>
             <a:endParaRPr lang="en-CA" dirty="0"/>
@@ -6873,10 +6763,17 @@
   <p:clrMapOvr>
     <a:masterClrMapping/>
   </p:clrMapOvr>
+  <p:timing>
+    <p:tnLst>
+      <p:par>
+        <p:cTn id="1" dur="indefinite" restart="never" nodeType="tmRoot"/>
+      </p:par>
+    </p:tnLst>
+  </p:timing>
 </p:sld>
 </file>
 
-<file path=ppt/slides/slide12.xml><?xml version="1.0" encoding="utf-8"?>
+<file path=ppt/slides/slide11.xml><?xml version="1.0" encoding="utf-8"?>
 <p:sld xmlns:a="http://schemas.openxmlformats.org/drawingml/2006/main" xmlns:r="http://schemas.openxmlformats.org/officeDocument/2006/relationships" xmlns:p="http://schemas.openxmlformats.org/presentationml/2006/main">
   <p:cSld>
     <p:spTree>
@@ -8581,10 +8478,17 @@
   <p:clrMapOvr>
     <a:masterClrMapping/>
   </p:clrMapOvr>
+  <p:timing>
+    <p:tnLst>
+      <p:par>
+        <p:cTn id="1" dur="indefinite" restart="never" nodeType="tmRoot"/>
+      </p:par>
+    </p:tnLst>
+  </p:timing>
 </p:sld>
 </file>
 
-<file path=ppt/slides/slide13.xml><?xml version="1.0" encoding="utf-8"?>
+<file path=ppt/slides/slide12.xml><?xml version="1.0" encoding="utf-8"?>
 <p:sld xmlns:a="http://schemas.openxmlformats.org/drawingml/2006/main" xmlns:r="http://schemas.openxmlformats.org/officeDocument/2006/relationships" xmlns:p="http://schemas.openxmlformats.org/presentationml/2006/main">
   <p:cSld>
     <p:spTree>
@@ -8671,9 +8575,16 @@
               <a:rPr lang="en-US" sz="3600" dirty="0" smtClean="0"/>
               <a:t>Corresponding entries from National Vulnerability Database </a:t>
             </a:r>
+            <a:br>
+              <a:rPr lang="en-US" sz="3600" dirty="0" smtClean="0"/>
+            </a:br>
+            <a:r>
+              <a:rPr lang="en-US" sz="3600" dirty="0" smtClean="0"/>
+              <a:t>(</a:t>
+            </a:r>
             <a:r>
               <a:rPr lang="en-US" sz="3600" dirty="0"/>
-              <a:t>(NVD - https://nvd.nist.gov</a:t>
+              <a:t>NVD - https://nvd.nist.gov</a:t>
             </a:r>
             <a:r>
               <a:rPr lang="en-US" sz="3600" dirty="0" smtClean="0"/>
@@ -8692,10 +8603,17 @@
   <p:clrMapOvr>
     <a:masterClrMapping/>
   </p:clrMapOvr>
+  <p:timing>
+    <p:tnLst>
+      <p:par>
+        <p:cTn id="1" dur="indefinite" restart="never" nodeType="tmRoot"/>
+      </p:par>
+    </p:tnLst>
+  </p:timing>
 </p:sld>
 </file>
 
-<file path=ppt/slides/slide14.xml><?xml version="1.0" encoding="utf-8"?>
+<file path=ppt/slides/slide13.xml><?xml version="1.0" encoding="utf-8"?>
 <p:sld xmlns:a="http://schemas.openxmlformats.org/drawingml/2006/main" xmlns:r="http://schemas.openxmlformats.org/officeDocument/2006/relationships" xmlns:p="http://schemas.openxmlformats.org/presentationml/2006/main">
   <p:cSld>
     <p:spTree>
@@ -9300,6 +9218,142 @@
   <p:clrMapOvr>
     <a:masterClrMapping/>
   </p:clrMapOvr>
+  <p:timing>
+    <p:tnLst>
+      <p:par>
+        <p:cTn id="1" dur="indefinite" restart="never" nodeType="tmRoot"/>
+      </p:par>
+    </p:tnLst>
+  </p:timing>
+</p:sld>
+</file>
+
+<file path=ppt/slides/slide14.xml><?xml version="1.0" encoding="utf-8"?>
+<p:sld xmlns:a="http://schemas.openxmlformats.org/drawingml/2006/main" xmlns:r="http://schemas.openxmlformats.org/officeDocument/2006/relationships" xmlns:p="http://schemas.openxmlformats.org/presentationml/2006/main">
+  <p:cSld>
+    <p:spTree>
+      <p:nvGrpSpPr>
+        <p:cNvPr id="1" name=""/>
+        <p:cNvGrpSpPr/>
+        <p:nvPr/>
+      </p:nvGrpSpPr>
+      <p:grpSpPr>
+        <a:xfrm>
+          <a:off x="0" y="0"/>
+          <a:ext cx="0" cy="0"/>
+          <a:chOff x="0" y="0"/>
+          <a:chExt cx="0" cy="0"/>
+        </a:xfrm>
+      </p:grpSpPr>
+      <p:sp>
+        <p:nvSpPr>
+          <p:cNvPr id="2" name="Title 1"/>
+          <p:cNvSpPr>
+            <a:spLocks noGrp="1"/>
+          </p:cNvSpPr>
+          <p:nvPr>
+            <p:ph type="title"/>
+          </p:nvPr>
+        </p:nvSpPr>
+        <p:spPr>
+          <a:xfrm>
+            <a:off x="1484309" y="267788"/>
+            <a:ext cx="10018713" cy="1047206"/>
+          </a:xfrm>
+        </p:spPr>
+        <p:txBody>
+          <a:bodyPr>
+            <a:normAutofit/>
+          </a:bodyPr>
+          <a:lstStyle/>
+          <a:p>
+            <a:r>
+              <a:rPr lang="en-US" sz="6000" dirty="0" smtClean="0"/>
+              <a:t>Method - Correlation</a:t>
+            </a:r>
+            <a:endParaRPr lang="en-CA" dirty="0"/>
+          </a:p>
+        </p:txBody>
+      </p:sp>
+      <p:sp>
+        <p:nvSpPr>
+          <p:cNvPr id="3" name="Content Placeholder 2"/>
+          <p:cNvSpPr>
+            <a:spLocks noGrp="1"/>
+          </p:cNvSpPr>
+          <p:nvPr>
+            <p:ph idx="1"/>
+          </p:nvPr>
+        </p:nvSpPr>
+        <p:spPr>
+          <a:xfrm>
+            <a:off x="1484308" y="1733006"/>
+            <a:ext cx="8800516" cy="4563291"/>
+          </a:xfrm>
+        </p:spPr>
+        <p:txBody>
+          <a:bodyPr anchor="ctr">
+            <a:normAutofit/>
+          </a:bodyPr>
+          <a:lstStyle/>
+          <a:p>
+            <a:r>
+              <a:rPr lang="en-US" sz="3600" dirty="0" smtClean="0"/>
+              <a:t>Vulnerabilities classified based on links to Exploit Database </a:t>
+            </a:r>
+            <a:br>
+              <a:rPr lang="en-US" sz="3600" dirty="0" smtClean="0"/>
+            </a:br>
+            <a:r>
+              <a:rPr lang="en-US" sz="3600" dirty="0" smtClean="0"/>
+              <a:t>(EDB </a:t>
+            </a:r>
+            <a:r>
+              <a:rPr lang="en-US" sz="3600" dirty="0"/>
+              <a:t>- https://</a:t>
+            </a:r>
+            <a:r>
+              <a:rPr lang="en-US" sz="3600" dirty="0" smtClean="0"/>
+              <a:t>www.exploit-db.com/)</a:t>
+            </a:r>
+          </a:p>
+          <a:p>
+            <a:r>
+              <a:rPr lang="en-US" sz="3600" dirty="0" err="1" smtClean="0"/>
+              <a:t>Younis</a:t>
+            </a:r>
+            <a:r>
+              <a:rPr lang="en-US" sz="3600" dirty="0" smtClean="0"/>
+              <a:t> </a:t>
+            </a:r>
+            <a:r>
+              <a:rPr lang="en-US" sz="3600" i="1" dirty="0" smtClean="0"/>
+              <a:t>et al. </a:t>
+            </a:r>
+            <a:r>
+              <a:rPr lang="en-US" sz="3600" dirty="0" smtClean="0"/>
+              <a:t>[6] used intra-class correlation coefficient (ICC) to conveys distinctness of base score predictions </a:t>
+            </a:r>
+          </a:p>
+        </p:txBody>
+      </p:sp>
+    </p:spTree>
+    <p:extLst>
+      <p:ext uri="{BB962C8B-B14F-4D97-AF65-F5344CB8AC3E}">
+        <p14:creationId xmlns:p14="http://schemas.microsoft.com/office/powerpoint/2010/main" val="728799164"/>
+      </p:ext>
+    </p:extLst>
+  </p:cSld>
+  <p:clrMapOvr>
+    <a:masterClrMapping/>
+  </p:clrMapOvr>
+  <p:timing>
+    <p:tnLst>
+      <p:par>
+        <p:cTn id="1" dur="indefinite" restart="never" nodeType="tmRoot"/>
+      </p:par>
+    </p:tnLst>
+  </p:timing>
 </p:sld>
 </file>
 
@@ -9350,149 +9404,8 @@
           </a:p>
         </p:txBody>
       </p:sp>
-      <p:sp>
-        <p:nvSpPr>
-          <p:cNvPr id="3" name="Content Placeholder 2"/>
-          <p:cNvSpPr>
-            <a:spLocks noGrp="1"/>
-          </p:cNvSpPr>
-          <p:nvPr>
-            <p:ph idx="1"/>
-          </p:nvPr>
-        </p:nvSpPr>
-        <p:spPr>
-          <a:xfrm>
-            <a:off x="1484308" y="1733006"/>
-            <a:ext cx="8800516" cy="4563291"/>
-          </a:xfrm>
-        </p:spPr>
-        <p:txBody>
-          <a:bodyPr anchor="ctr">
-            <a:normAutofit/>
-          </a:bodyPr>
-          <a:lstStyle/>
-          <a:p>
-            <a:r>
-              <a:rPr lang="en-US" sz="3600" dirty="0" smtClean="0"/>
-              <a:t>Vulnerabilities classified based on links to Exploit Database </a:t>
-            </a:r>
-            <a:r>
-              <a:rPr lang="en-US" sz="3600" dirty="0" smtClean="0"/>
-              <a:t/>
-            </a:r>
-            <a:br>
-              <a:rPr lang="en-US" sz="3600" dirty="0" smtClean="0"/>
-            </a:br>
-            <a:r>
-              <a:rPr lang="en-US" sz="3600" dirty="0" smtClean="0"/>
-              <a:t>(</a:t>
-            </a:r>
-            <a:r>
-              <a:rPr lang="en-US" sz="3600" dirty="0" smtClean="0"/>
-              <a:t>EDB </a:t>
-            </a:r>
-            <a:r>
-              <a:rPr lang="en-US" sz="3600" dirty="0"/>
-              <a:t>- https://</a:t>
-            </a:r>
-            <a:r>
-              <a:rPr lang="en-US" sz="3600" dirty="0" smtClean="0"/>
-              <a:t>www.exploit-db.com/)</a:t>
-            </a:r>
-          </a:p>
-          <a:p>
-            <a:r>
-              <a:rPr lang="en-US" sz="3600" dirty="0" err="1" smtClean="0"/>
-              <a:t>Younis</a:t>
-            </a:r>
-            <a:r>
-              <a:rPr lang="en-US" sz="3600" dirty="0" smtClean="0"/>
-              <a:t> </a:t>
-            </a:r>
-            <a:r>
-              <a:rPr lang="en-US" sz="3600" i="1" dirty="0" smtClean="0"/>
-              <a:t>et al. </a:t>
-            </a:r>
-            <a:r>
-              <a:rPr lang="en-US" sz="3600" dirty="0" smtClean="0"/>
-              <a:t>[6] </a:t>
-            </a:r>
-            <a:r>
-              <a:rPr lang="en-US" sz="3600" dirty="0" smtClean="0"/>
-              <a:t>used intra-class correlation coefficient (ICC) to conveys distinctness of predictions </a:t>
-            </a:r>
-          </a:p>
-        </p:txBody>
-      </p:sp>
-    </p:spTree>
-    <p:extLst>
-      <p:ext uri="{BB962C8B-B14F-4D97-AF65-F5344CB8AC3E}">
-        <p14:creationId xmlns:p14="http://schemas.microsoft.com/office/powerpoint/2010/main" val="728799164"/>
-      </p:ext>
-    </p:extLst>
-  </p:cSld>
-  <p:clrMapOvr>
-    <a:masterClrMapping/>
-  </p:clrMapOvr>
-  <p:timing>
-    <p:tnLst>
-      <p:par>
-        <p:cTn id="1" dur="indefinite" restart="never" nodeType="tmRoot"/>
-      </p:par>
-    </p:tnLst>
-  </p:timing>
-</p:sld>
-</file>
-
-<file path=ppt/slides/slide16.xml><?xml version="1.0" encoding="utf-8"?>
-<p:sld xmlns:a="http://schemas.openxmlformats.org/drawingml/2006/main" xmlns:r="http://schemas.openxmlformats.org/officeDocument/2006/relationships" xmlns:p="http://schemas.openxmlformats.org/presentationml/2006/main">
-  <p:cSld>
-    <p:spTree>
-      <p:nvGrpSpPr>
-        <p:cNvPr id="1" name=""/>
-        <p:cNvGrpSpPr/>
-        <p:nvPr/>
-      </p:nvGrpSpPr>
-      <p:grpSpPr>
-        <a:xfrm>
-          <a:off x="0" y="0"/>
-          <a:ext cx="0" cy="0"/>
-          <a:chOff x="0" y="0"/>
-          <a:chExt cx="0" cy="0"/>
-        </a:xfrm>
-      </p:grpSpPr>
-      <p:sp>
-        <p:nvSpPr>
-          <p:cNvPr id="2" name="Title 1"/>
-          <p:cNvSpPr>
-            <a:spLocks noGrp="1"/>
-          </p:cNvSpPr>
-          <p:nvPr>
-            <p:ph type="title"/>
-          </p:nvPr>
-        </p:nvSpPr>
-        <p:spPr>
-          <a:xfrm>
-            <a:off x="1484309" y="267788"/>
-            <a:ext cx="10018713" cy="1047206"/>
-          </a:xfrm>
-        </p:spPr>
-        <p:txBody>
-          <a:bodyPr>
-            <a:normAutofit/>
-          </a:bodyPr>
-          <a:lstStyle/>
-          <a:p>
-            <a:r>
-              <a:rPr lang="en-US" sz="6000" dirty="0" smtClean="0"/>
-              <a:t>Method - Correlation</a:t>
-            </a:r>
-            <a:endParaRPr lang="en-CA" dirty="0"/>
-          </a:p>
-        </p:txBody>
-      </p:sp>
-      <mc:AlternateContent xmlns:mc="http://schemas.openxmlformats.org/markup-compatibility/2006">
-        <mc:Choice xmlns:a14="http://schemas.microsoft.com/office/drawing/2010/main" Requires="a14">
+      <mc:AlternateContent xmlns:mc="http://schemas.openxmlformats.org/markup-compatibility/2006" xmlns:a14="http://schemas.microsoft.com/office/drawing/2010/main">
+        <mc:Choice Requires="a14">
           <p:sp>
             <p:nvSpPr>
               <p:cNvPr id="3" name="Content Placeholder 2"/>
@@ -9728,7 +9641,7 @@
             </p:txBody>
           </p:sp>
         </mc:Choice>
-        <mc:Fallback>
+        <mc:Fallback xmlns="">
           <p:sp>
             <p:nvSpPr>
               <p:cNvPr id="3" name="Content Placeholder 2"/>
@@ -9966,7 +9879,7 @@
 </p:sld>
 </file>
 
-<file path=ppt/slides/slide17.xml><?xml version="1.0" encoding="utf-8"?>
+<file path=ppt/slides/slide16.xml><?xml version="1.0" encoding="utf-8"?>
 <p:sld xmlns:a="http://schemas.openxmlformats.org/drawingml/2006/main" xmlns:r="http://schemas.openxmlformats.org/officeDocument/2006/relationships" xmlns:p="http://schemas.openxmlformats.org/presentationml/2006/main">
   <p:cSld>
     <p:spTree>
@@ -10112,7 +10025,7 @@
 </p:sld>
 </file>
 
-<file path=ppt/slides/slide18.xml><?xml version="1.0" encoding="utf-8"?>
+<file path=ppt/slides/slide17.xml><?xml version="1.0" encoding="utf-8"?>
 <p:sld xmlns:a="http://schemas.openxmlformats.org/drawingml/2006/main" xmlns:r="http://schemas.openxmlformats.org/officeDocument/2006/relationships" xmlns:p="http://schemas.openxmlformats.org/presentationml/2006/main">
   <p:cSld>
     <p:spTree>
@@ -10193,13 +10106,8 @@
             </a:br>
             <a:r>
               <a:rPr lang="en-US" sz="3600" dirty="0" smtClean="0"/>
-              <a:t>Binary classification allows sensitivity and precision calculation </a:t>
-            </a:r>
-            <a:r>
-              <a:rPr lang="en-US" sz="3600" dirty="0" smtClean="0"/>
-              <a:t>[6].</a:t>
-            </a:r>
-            <a:endParaRPr lang="en-US" sz="3600" dirty="0" smtClean="0"/>
+              <a:t>Binary classification allows sensitivity and precision calculation [6].</a:t>
+            </a:r>
           </a:p>
         </p:txBody>
       </p:sp>
@@ -11190,7 +11098,7 @@
 </p:sld>
 </file>
 
-<file path=ppt/slides/slide19.xml><?xml version="1.0" encoding="utf-8"?>
+<file path=ppt/slides/slide18.xml><?xml version="1.0" encoding="utf-8"?>
 <p:sld xmlns:a="http://schemas.openxmlformats.org/drawingml/2006/main" xmlns:r="http://schemas.openxmlformats.org/officeDocument/2006/relationships" xmlns:p="http://schemas.openxmlformats.org/presentationml/2006/main">
   <p:cSld>
     <p:spTree>
@@ -12294,155 +12202,7 @@
 </p:sld>
 </file>
 
-<file path=ppt/slides/slide2.xml><?xml version="1.0" encoding="utf-8"?>
-<p:sld xmlns:a="http://schemas.openxmlformats.org/drawingml/2006/main" xmlns:r="http://schemas.openxmlformats.org/officeDocument/2006/relationships" xmlns:p="http://schemas.openxmlformats.org/presentationml/2006/main">
-  <p:cSld>
-    <p:spTree>
-      <p:nvGrpSpPr>
-        <p:cNvPr id="1" name=""/>
-        <p:cNvGrpSpPr/>
-        <p:nvPr/>
-      </p:nvGrpSpPr>
-      <p:grpSpPr>
-        <a:xfrm>
-          <a:off x="0" y="0"/>
-          <a:ext cx="0" cy="0"/>
-          <a:chOff x="0" y="0"/>
-          <a:chExt cx="0" cy="0"/>
-        </a:xfrm>
-      </p:grpSpPr>
-      <p:sp>
-        <p:nvSpPr>
-          <p:cNvPr id="2" name="Title 1"/>
-          <p:cNvSpPr>
-            <a:spLocks noGrp="1"/>
-          </p:cNvSpPr>
-          <p:nvPr>
-            <p:ph type="title"/>
-          </p:nvPr>
-        </p:nvSpPr>
-        <p:spPr>
-          <a:xfrm>
-            <a:off x="1484309" y="267788"/>
-            <a:ext cx="10018713" cy="1047206"/>
-          </a:xfrm>
-        </p:spPr>
-        <p:txBody>
-          <a:bodyPr>
-            <a:normAutofit/>
-          </a:bodyPr>
-          <a:lstStyle/>
-          <a:p>
-            <a:r>
-              <a:rPr lang="en-US" sz="6000" dirty="0" smtClean="0"/>
-              <a:t>Outline</a:t>
-            </a:r>
-            <a:endParaRPr lang="en-CA" dirty="0"/>
-          </a:p>
-        </p:txBody>
-      </p:sp>
-      <p:sp>
-        <p:nvSpPr>
-          <p:cNvPr id="3" name="Content Placeholder 2"/>
-          <p:cNvSpPr>
-            <a:spLocks noGrp="1"/>
-          </p:cNvSpPr>
-          <p:nvPr>
-            <p:ph idx="1"/>
-          </p:nvPr>
-        </p:nvSpPr>
-        <p:spPr>
-          <a:xfrm>
-            <a:off x="1484310" y="1314994"/>
-            <a:ext cx="10018713" cy="4981303"/>
-          </a:xfrm>
-        </p:spPr>
-        <p:txBody>
-          <a:bodyPr>
-            <a:normAutofit/>
-          </a:bodyPr>
-          <a:lstStyle/>
-          <a:p>
-            <a:r>
-              <a:rPr lang="en-US" sz="3600" dirty="0" smtClean="0"/>
-              <a:t>CVSS </a:t>
-            </a:r>
-            <a:r>
-              <a:rPr lang="en-US" sz="3600" dirty="0" smtClean="0"/>
-              <a:t>introduction</a:t>
-            </a:r>
-          </a:p>
-          <a:p>
-            <a:pPr lvl="1">
-              <a:spcBef>
-                <a:spcPts val="0"/>
-              </a:spcBef>
-              <a:spcAft>
-                <a:spcPts val="0"/>
-              </a:spcAft>
-              <a:buSzPct val="100000"/>
-              <a:buFont typeface="Wingdings" panose="05000000000000000000" pitchFamily="2" charset="2"/>
-              <a:buChar char="Ø"/>
-            </a:pPr>
-            <a:r>
-              <a:rPr lang="en-US" sz="2400" dirty="0" smtClean="0"/>
-              <a:t>Background &amp; Related work</a:t>
-            </a:r>
-            <a:endParaRPr lang="en-US" sz="2400" dirty="0" smtClean="0"/>
-          </a:p>
-          <a:p>
-            <a:r>
-              <a:rPr lang="en-US" sz="3600" dirty="0" smtClean="0"/>
-              <a:t>Method</a:t>
-            </a:r>
-          </a:p>
-          <a:p>
-            <a:pPr lvl="1">
-              <a:spcBef>
-                <a:spcPts val="0"/>
-              </a:spcBef>
-              <a:spcAft>
-                <a:spcPts val="0"/>
-              </a:spcAft>
-              <a:buSzPct val="100000"/>
-              <a:buFont typeface="Wingdings" panose="05000000000000000000" pitchFamily="2" charset="2"/>
-              <a:buChar char="Ø"/>
-            </a:pPr>
-            <a:r>
-              <a:rPr lang="en-US" sz="2400" smtClean="0"/>
-              <a:t>Optimization</a:t>
-            </a:r>
-            <a:endParaRPr lang="en-US" sz="2400" dirty="0" smtClean="0"/>
-          </a:p>
-          <a:p>
-            <a:r>
-              <a:rPr lang="en-US" sz="3600" dirty="0" smtClean="0"/>
-              <a:t>Results</a:t>
-            </a:r>
-          </a:p>
-          <a:p>
-            <a:r>
-              <a:rPr lang="en-US" sz="3600" dirty="0" smtClean="0"/>
-              <a:t>Discussion and conclusions</a:t>
-            </a:r>
-            <a:endParaRPr lang="en-CA" sz="3600" dirty="0"/>
-          </a:p>
-        </p:txBody>
-      </p:sp>
-    </p:spTree>
-    <p:extLst>
-      <p:ext uri="{BB962C8B-B14F-4D97-AF65-F5344CB8AC3E}">
-        <p14:creationId xmlns:p14="http://schemas.microsoft.com/office/powerpoint/2010/main" val="2380731580"/>
-      </p:ext>
-    </p:extLst>
-  </p:cSld>
-  <p:clrMapOvr>
-    <a:masterClrMapping/>
-  </p:clrMapOvr>
-</p:sld>
-</file>
-
-<file path=ppt/slides/slide20.xml><?xml version="1.0" encoding="utf-8"?>
+<file path=ppt/slides/slide19.xml><?xml version="1.0" encoding="utf-8"?>
 <p:sld xmlns:a="http://schemas.openxmlformats.org/drawingml/2006/main" xmlns:r="http://schemas.openxmlformats.org/officeDocument/2006/relationships" xmlns:p="http://schemas.openxmlformats.org/presentationml/2006/main">
   <p:cSld>
     <p:spTree>
@@ -14203,7 +13963,157 @@
 </p:sld>
 </file>
 
-<file path=ppt/slides/slide21.xml><?xml version="1.0" encoding="utf-8"?>
+<file path=ppt/slides/slide2.xml><?xml version="1.0" encoding="utf-8"?>
+<p:sld xmlns:a="http://schemas.openxmlformats.org/drawingml/2006/main" xmlns:r="http://schemas.openxmlformats.org/officeDocument/2006/relationships" xmlns:p="http://schemas.openxmlformats.org/presentationml/2006/main">
+  <p:cSld>
+    <p:spTree>
+      <p:nvGrpSpPr>
+        <p:cNvPr id="1" name=""/>
+        <p:cNvGrpSpPr/>
+        <p:nvPr/>
+      </p:nvGrpSpPr>
+      <p:grpSpPr>
+        <a:xfrm>
+          <a:off x="0" y="0"/>
+          <a:ext cx="0" cy="0"/>
+          <a:chOff x="0" y="0"/>
+          <a:chExt cx="0" cy="0"/>
+        </a:xfrm>
+      </p:grpSpPr>
+      <p:sp>
+        <p:nvSpPr>
+          <p:cNvPr id="2" name="Title 1"/>
+          <p:cNvSpPr>
+            <a:spLocks noGrp="1"/>
+          </p:cNvSpPr>
+          <p:nvPr>
+            <p:ph type="title"/>
+          </p:nvPr>
+        </p:nvSpPr>
+        <p:spPr>
+          <a:xfrm>
+            <a:off x="1484309" y="267788"/>
+            <a:ext cx="10018713" cy="1047206"/>
+          </a:xfrm>
+        </p:spPr>
+        <p:txBody>
+          <a:bodyPr>
+            <a:normAutofit/>
+          </a:bodyPr>
+          <a:lstStyle/>
+          <a:p>
+            <a:r>
+              <a:rPr lang="en-US" sz="6000" dirty="0" smtClean="0"/>
+              <a:t>Outline</a:t>
+            </a:r>
+            <a:endParaRPr lang="en-CA" dirty="0"/>
+          </a:p>
+        </p:txBody>
+      </p:sp>
+      <p:sp>
+        <p:nvSpPr>
+          <p:cNvPr id="3" name="Content Placeholder 2"/>
+          <p:cNvSpPr>
+            <a:spLocks noGrp="1"/>
+          </p:cNvSpPr>
+          <p:nvPr>
+            <p:ph idx="1"/>
+          </p:nvPr>
+        </p:nvSpPr>
+        <p:spPr>
+          <a:xfrm>
+            <a:off x="1484310" y="1314994"/>
+            <a:ext cx="10018713" cy="4981303"/>
+          </a:xfrm>
+        </p:spPr>
+        <p:txBody>
+          <a:bodyPr>
+            <a:normAutofit/>
+          </a:bodyPr>
+          <a:lstStyle/>
+          <a:p>
+            <a:r>
+              <a:rPr lang="en-US" sz="3600" dirty="0" smtClean="0"/>
+              <a:t>CVSS introduction</a:t>
+            </a:r>
+          </a:p>
+          <a:p>
+            <a:pPr lvl="1">
+              <a:spcBef>
+                <a:spcPts val="0"/>
+              </a:spcBef>
+              <a:spcAft>
+                <a:spcPts val="0"/>
+              </a:spcAft>
+              <a:buSzPct val="100000"/>
+              <a:buFont typeface="Wingdings" panose="05000000000000000000" pitchFamily="2" charset="2"/>
+              <a:buChar char="Ø"/>
+            </a:pPr>
+            <a:r>
+              <a:rPr lang="en-US" sz="2400" dirty="0" smtClean="0"/>
+              <a:t>Background &amp; Related work</a:t>
+            </a:r>
+          </a:p>
+          <a:p>
+            <a:r>
+              <a:rPr lang="en-US" sz="3600" dirty="0" smtClean="0"/>
+              <a:t>Method</a:t>
+            </a:r>
+          </a:p>
+          <a:p>
+            <a:pPr lvl="1">
+              <a:spcBef>
+                <a:spcPts val="0"/>
+              </a:spcBef>
+              <a:spcAft>
+                <a:spcPts val="0"/>
+              </a:spcAft>
+              <a:buSzPct val="100000"/>
+              <a:buFont typeface="Wingdings" panose="05000000000000000000" pitchFamily="2" charset="2"/>
+              <a:buChar char="Ø"/>
+            </a:pPr>
+            <a:r>
+              <a:rPr lang="en-US" sz="2400" smtClean="0"/>
+              <a:t>Optimization</a:t>
+            </a:r>
+            <a:endParaRPr lang="en-US" sz="2400" dirty="0" smtClean="0"/>
+          </a:p>
+          <a:p>
+            <a:r>
+              <a:rPr lang="en-US" sz="3600" dirty="0" smtClean="0"/>
+              <a:t>Results</a:t>
+            </a:r>
+          </a:p>
+          <a:p>
+            <a:r>
+              <a:rPr lang="en-US" sz="3600" dirty="0" smtClean="0"/>
+              <a:t>Discussion and conclusions</a:t>
+            </a:r>
+            <a:endParaRPr lang="en-CA" sz="3600" dirty="0"/>
+          </a:p>
+        </p:txBody>
+      </p:sp>
+    </p:spTree>
+    <p:extLst>
+      <p:ext uri="{BB962C8B-B14F-4D97-AF65-F5344CB8AC3E}">
+        <p14:creationId xmlns:p14="http://schemas.microsoft.com/office/powerpoint/2010/main" val="2380731580"/>
+      </p:ext>
+    </p:extLst>
+  </p:cSld>
+  <p:clrMapOvr>
+    <a:masterClrMapping/>
+  </p:clrMapOvr>
+  <p:timing>
+    <p:tnLst>
+      <p:par>
+        <p:cTn id="1" dur="indefinite" restart="never" nodeType="tmRoot"/>
+      </p:par>
+    </p:tnLst>
+  </p:timing>
+</p:sld>
+</file>
+
+<file path=ppt/slides/slide20.xml><?xml version="1.0" encoding="utf-8"?>
 <p:sld xmlns:a="http://schemas.openxmlformats.org/drawingml/2006/main" xmlns:r="http://schemas.openxmlformats.org/officeDocument/2006/relationships" xmlns:p="http://schemas.openxmlformats.org/presentationml/2006/main">
   <p:cSld>
     <p:spTree>
@@ -15281,7 +15191,7 @@
 </p:sld>
 </file>
 
-<file path=ppt/slides/slide22.xml><?xml version="1.0" encoding="utf-8"?>
+<file path=ppt/slides/slide21.xml><?xml version="1.0" encoding="utf-8"?>
 <p:sld xmlns:a="http://schemas.openxmlformats.org/drawingml/2006/main" xmlns:r="http://schemas.openxmlformats.org/officeDocument/2006/relationships" xmlns:p="http://schemas.openxmlformats.org/presentationml/2006/main">
   <p:cSld>
     <p:spTree>
@@ -16721,7 +16631,7 @@
 </p:sld>
 </file>
 
-<file path=ppt/slides/slide23.xml><?xml version="1.0" encoding="utf-8"?>
+<file path=ppt/slides/slide22.xml><?xml version="1.0" encoding="utf-8"?>
 <p:sld xmlns:a="http://schemas.openxmlformats.org/drawingml/2006/main" xmlns:r="http://schemas.openxmlformats.org/officeDocument/2006/relationships" xmlns:p="http://schemas.openxmlformats.org/presentationml/2006/main">
   <p:cSld>
     <p:spTree>
@@ -16866,6 +16776,108 @@
 </p:sld>
 </file>
 
+<file path=ppt/slides/slide23.xml><?xml version="1.0" encoding="utf-8"?>
+<p:sld xmlns:a="http://schemas.openxmlformats.org/drawingml/2006/main" xmlns:r="http://schemas.openxmlformats.org/officeDocument/2006/relationships" xmlns:p="http://schemas.openxmlformats.org/presentationml/2006/main">
+  <p:cSld>
+    <p:spTree>
+      <p:nvGrpSpPr>
+        <p:cNvPr id="1" name=""/>
+        <p:cNvGrpSpPr/>
+        <p:nvPr/>
+      </p:nvGrpSpPr>
+      <p:grpSpPr>
+        <a:xfrm>
+          <a:off x="0" y="0"/>
+          <a:ext cx="0" cy="0"/>
+          <a:chOff x="0" y="0"/>
+          <a:chExt cx="0" cy="0"/>
+        </a:xfrm>
+      </p:grpSpPr>
+      <p:sp>
+        <p:nvSpPr>
+          <p:cNvPr id="2" name="Title 1"/>
+          <p:cNvSpPr>
+            <a:spLocks noGrp="1"/>
+          </p:cNvSpPr>
+          <p:nvPr>
+            <p:ph type="title"/>
+          </p:nvPr>
+        </p:nvSpPr>
+        <p:spPr>
+          <a:xfrm>
+            <a:off x="1484309" y="267788"/>
+            <a:ext cx="10018713" cy="1047206"/>
+          </a:xfrm>
+        </p:spPr>
+        <p:txBody>
+          <a:bodyPr>
+            <a:normAutofit/>
+          </a:bodyPr>
+          <a:lstStyle/>
+          <a:p>
+            <a:r>
+              <a:rPr lang="en-US" sz="6000" dirty="0" smtClean="0"/>
+              <a:t>Discussion – Ongoing Work</a:t>
+            </a:r>
+            <a:endParaRPr lang="en-CA" dirty="0"/>
+          </a:p>
+        </p:txBody>
+      </p:sp>
+      <p:sp>
+        <p:nvSpPr>
+          <p:cNvPr id="12" name="Content Placeholder 2"/>
+          <p:cNvSpPr>
+            <a:spLocks noGrp="1"/>
+          </p:cNvSpPr>
+          <p:nvPr>
+            <p:ph idx="1"/>
+          </p:nvPr>
+        </p:nvSpPr>
+        <p:spPr>
+          <a:xfrm>
+            <a:off x="1323703" y="1314994"/>
+            <a:ext cx="9509760" cy="4981303"/>
+          </a:xfrm>
+        </p:spPr>
+        <p:txBody>
+          <a:bodyPr anchor="ctr">
+            <a:normAutofit/>
+          </a:bodyPr>
+          <a:lstStyle/>
+          <a:p>
+            <a:r>
+              <a:rPr lang="en-US" sz="3600" dirty="0" smtClean="0"/>
+              <a:t>Optimize on other performance metrics</a:t>
+            </a:r>
+          </a:p>
+          <a:p>
+            <a:r>
+              <a:rPr lang="en-US" sz="3600" dirty="0" smtClean="0"/>
+              <a:t>Assess optimized equation on multiple vulnerability sets</a:t>
+            </a:r>
+          </a:p>
+        </p:txBody>
+      </p:sp>
+    </p:spTree>
+    <p:extLst>
+      <p:ext uri="{BB962C8B-B14F-4D97-AF65-F5344CB8AC3E}">
+        <p14:creationId xmlns:p14="http://schemas.microsoft.com/office/powerpoint/2010/main" val="2675148060"/>
+      </p:ext>
+    </p:extLst>
+  </p:cSld>
+  <p:clrMapOvr>
+    <a:masterClrMapping/>
+  </p:clrMapOvr>
+  <p:timing>
+    <p:tnLst>
+      <p:par>
+        <p:cTn id="1" dur="indefinite" restart="never" nodeType="tmRoot"/>
+      </p:par>
+    </p:tnLst>
+  </p:timing>
+</p:sld>
+</file>
+
 <file path=ppt/slides/slide24.xml><?xml version="1.0" encoding="utf-8"?>
 <p:sld xmlns:a="http://schemas.openxmlformats.org/drawingml/2006/main" xmlns:r="http://schemas.openxmlformats.org/officeDocument/2006/relationships" xmlns:p="http://schemas.openxmlformats.org/presentationml/2006/main">
   <p:cSld>
@@ -16907,7 +16919,7 @@
           <a:p>
             <a:r>
               <a:rPr lang="en-US" sz="6000" dirty="0" smtClean="0"/>
-              <a:t>Discussion – Ongoing Work</a:t>
+              <a:t>Conclusions</a:t>
             </a:r>
             <a:endParaRPr lang="en-CA" dirty="0"/>
           </a:p>
@@ -16926,7 +16938,7 @@
         <p:spPr>
           <a:xfrm>
             <a:off x="1323703" y="1314994"/>
-            <a:ext cx="9509760" cy="4981303"/>
+            <a:ext cx="9658333" cy="4981303"/>
           </a:xfrm>
         </p:spPr>
         <p:txBody>
@@ -16937,13 +16949,19 @@
           <a:p>
             <a:r>
               <a:rPr lang="en-US" sz="3600" dirty="0" smtClean="0"/>
-              <a:t>Optimize on other performance metrics</a:t>
+              <a:t>Optimizing on ICC does not necessarily improve CVSS utility</a:t>
             </a:r>
           </a:p>
           <a:p>
             <a:r>
               <a:rPr lang="en-US" sz="3600" dirty="0" smtClean="0"/>
-              <a:t>Assess optimized equation on multiple vulnerability sets</a:t>
+              <a:t>Other metrics should be investigated</a:t>
+            </a:r>
+          </a:p>
+          <a:p>
+            <a:r>
+              <a:rPr lang="en-US" sz="3600" dirty="0" smtClean="0"/>
+              <a:t>Statistical validation should be performed</a:t>
             </a:r>
           </a:p>
         </p:txBody>
@@ -16951,7 +16969,7 @@
     </p:spTree>
     <p:extLst>
       <p:ext uri="{BB962C8B-B14F-4D97-AF65-F5344CB8AC3E}">
-        <p14:creationId xmlns:p14="http://schemas.microsoft.com/office/powerpoint/2010/main" val="2675148060"/>
+        <p14:creationId xmlns:p14="http://schemas.microsoft.com/office/powerpoint/2010/main" val="4095538184"/>
       </p:ext>
     </p:extLst>
   </p:cSld>
@@ -16997,74 +17015,36 @@
         </p:nvSpPr>
         <p:spPr>
           <a:xfrm>
-            <a:off x="1484309" y="267788"/>
-            <a:ext cx="10018713" cy="1047206"/>
+            <a:off x="1630627" y="2373809"/>
+            <a:ext cx="8930747" cy="2110382"/>
           </a:xfrm>
         </p:spPr>
         <p:txBody>
           <a:bodyPr>
-            <a:normAutofit/>
+            <a:noAutofit/>
           </a:bodyPr>
           <a:lstStyle/>
           <a:p>
-            <a:r>
-              <a:rPr lang="en-US" sz="6000" dirty="0" smtClean="0"/>
-              <a:t>Conclusions</a:t>
-            </a:r>
-            <a:endParaRPr lang="en-CA" dirty="0"/>
-          </a:p>
-        </p:txBody>
-      </p:sp>
-      <p:sp>
-        <p:nvSpPr>
-          <p:cNvPr id="12" name="Content Placeholder 2"/>
-          <p:cNvSpPr>
-            <a:spLocks noGrp="1"/>
-          </p:cNvSpPr>
-          <p:nvPr>
-            <p:ph idx="1"/>
-          </p:nvPr>
-        </p:nvSpPr>
-        <p:spPr>
-          <a:xfrm>
-            <a:off x="1323703" y="1314994"/>
-            <a:ext cx="9658333" cy="4981303"/>
-          </a:xfrm>
-        </p:spPr>
-        <p:txBody>
-          <a:bodyPr anchor="ctr">
-            <a:normAutofit/>
-          </a:bodyPr>
-          <a:lstStyle/>
-          <a:p>
-            <a:r>
-              <a:rPr lang="en-US" sz="3600" dirty="0" smtClean="0"/>
-              <a:t>Optimizing on ICC does not necessarily improve </a:t>
-            </a:r>
-            <a:r>
-              <a:rPr lang="en-US" sz="3600" dirty="0" smtClean="0"/>
-              <a:t>CVSS utility</a:t>
-            </a:r>
-            <a:endParaRPr lang="en-US" sz="3600" dirty="0" smtClean="0"/>
-          </a:p>
-          <a:p>
-            <a:r>
-              <a:rPr lang="en-US" sz="3600" dirty="0" smtClean="0"/>
-              <a:t>Other metrics should be investigated</a:t>
-            </a:r>
-          </a:p>
-          <a:p>
-            <a:r>
-              <a:rPr lang="en-US" sz="3600" dirty="0" smtClean="0"/>
-              <a:t>Statistical validation should be performed</a:t>
-            </a:r>
+            <a:pPr algn="ctr"/>
+            <a:r>
+              <a:rPr lang="en-US" sz="6600" dirty="0" smtClean="0"/>
+              <a:t>Thank you!</a:t>
+            </a:r>
+            <a:br>
+              <a:rPr lang="en-US" sz="6600" dirty="0" smtClean="0"/>
+            </a:br>
+            <a:r>
+              <a:rPr lang="en-US" sz="6600" dirty="0" smtClean="0"/>
+              <a:t>Questions?</a:t>
+            </a:r>
+            <a:endParaRPr lang="en-CA" sz="6600" dirty="0"/>
           </a:p>
         </p:txBody>
       </p:sp>
     </p:spTree>
     <p:extLst>
       <p:ext uri="{BB962C8B-B14F-4D97-AF65-F5344CB8AC3E}">
-        <p14:creationId xmlns:p14="http://schemas.microsoft.com/office/powerpoint/2010/main" val="4095538184"/>
+        <p14:creationId xmlns:p14="http://schemas.microsoft.com/office/powerpoint/2010/main" val="1536031132"/>
       </p:ext>
     </p:extLst>
   </p:cSld>
@@ -17082,74 +17062,6 @@
 </file>
 
 <file path=ppt/slides/slide26.xml><?xml version="1.0" encoding="utf-8"?>
-<p:sld xmlns:a="http://schemas.openxmlformats.org/drawingml/2006/main" xmlns:r="http://schemas.openxmlformats.org/officeDocument/2006/relationships" xmlns:p="http://schemas.openxmlformats.org/presentationml/2006/main">
-  <p:cSld>
-    <p:spTree>
-      <p:nvGrpSpPr>
-        <p:cNvPr id="1" name=""/>
-        <p:cNvGrpSpPr/>
-        <p:nvPr/>
-      </p:nvGrpSpPr>
-      <p:grpSpPr>
-        <a:xfrm>
-          <a:off x="0" y="0"/>
-          <a:ext cx="0" cy="0"/>
-          <a:chOff x="0" y="0"/>
-          <a:chExt cx="0" cy="0"/>
-        </a:xfrm>
-      </p:grpSpPr>
-      <p:sp>
-        <p:nvSpPr>
-          <p:cNvPr id="2" name="Title 1"/>
-          <p:cNvSpPr>
-            <a:spLocks noGrp="1"/>
-          </p:cNvSpPr>
-          <p:nvPr>
-            <p:ph type="title"/>
-          </p:nvPr>
-        </p:nvSpPr>
-        <p:spPr>
-          <a:xfrm>
-            <a:off x="1630627" y="2373809"/>
-            <a:ext cx="8930747" cy="2110382"/>
-          </a:xfrm>
-        </p:spPr>
-        <p:txBody>
-          <a:bodyPr>
-            <a:noAutofit/>
-          </a:bodyPr>
-          <a:lstStyle/>
-          <a:p>
-            <a:pPr algn="ctr"/>
-            <a:r>
-              <a:rPr lang="en-US" sz="6600" dirty="0" smtClean="0"/>
-              <a:t>Thank you!</a:t>
-            </a:r>
-            <a:br>
-              <a:rPr lang="en-US" sz="6600" dirty="0" smtClean="0"/>
-            </a:br>
-            <a:r>
-              <a:rPr lang="en-US" sz="6600" dirty="0" smtClean="0"/>
-              <a:t>Questions?</a:t>
-            </a:r>
-            <a:endParaRPr lang="en-CA" sz="6600" dirty="0"/>
-          </a:p>
-        </p:txBody>
-      </p:sp>
-    </p:spTree>
-    <p:extLst>
-      <p:ext uri="{BB962C8B-B14F-4D97-AF65-F5344CB8AC3E}">
-        <p14:creationId xmlns:p14="http://schemas.microsoft.com/office/powerpoint/2010/main" val="1536031132"/>
-      </p:ext>
-    </p:extLst>
-  </p:cSld>
-  <p:clrMapOvr>
-    <a:masterClrMapping/>
-  </p:clrMapOvr>
-</p:sld>
-</file>
-
-<file path=ppt/slides/slide27.xml><?xml version="1.0" encoding="utf-8"?>
 <p:sld xmlns:a="http://schemas.openxmlformats.org/drawingml/2006/main" xmlns:r="http://schemas.openxmlformats.org/officeDocument/2006/relationships" xmlns:p="http://schemas.openxmlformats.org/presentationml/2006/main">
   <p:cSld>
     <p:spTree>
@@ -17617,6 +17529,13 @@
   <p:clrMapOvr>
     <a:masterClrMapping/>
   </p:clrMapOvr>
+  <p:timing>
+    <p:tnLst>
+      <p:par>
+        <p:cTn id="1" dur="indefinite" restart="never" nodeType="tmRoot"/>
+      </p:par>
+    </p:tnLst>
+  </p:timing>
 </p:sld>
 </file>
 
@@ -17713,6 +17632,13 @@
   <p:clrMapOvr>
     <a:masterClrMapping/>
   </p:clrMapOvr>
+  <p:timing>
+    <p:tnLst>
+      <p:par>
+        <p:cTn id="1" dur="indefinite" restart="never" nodeType="tmRoot"/>
+      </p:par>
+    </p:tnLst>
+  </p:timing>
 </p:sld>
 </file>
 
@@ -17808,6 +17734,13 @@
   <p:clrMapOvr>
     <a:masterClrMapping/>
   </p:clrMapOvr>
+  <p:timing>
+    <p:tnLst>
+      <p:par>
+        <p:cTn id="1" dur="indefinite" restart="never" nodeType="tmRoot"/>
+      </p:par>
+    </p:tnLst>
+  </p:timing>
 </p:sld>
 </file>
 
@@ -17903,11 +17836,7 @@
           <a:p>
             <a:r>
               <a:rPr lang="en-US" sz="2800" dirty="0" smtClean="0"/>
-              <a:t>Environmental </a:t>
-            </a:r>
-            <a:r>
-              <a:rPr lang="en-US" sz="2800" dirty="0" smtClean="0"/>
-              <a:t>score</a:t>
+              <a:t>Environmental score</a:t>
             </a:r>
             <a:endParaRPr lang="en-US" sz="3200" dirty="0" smtClean="0"/>
           </a:p>
@@ -17923,6 +17852,13 @@
   <p:clrMapOvr>
     <a:masterClrMapping/>
   </p:clrMapOvr>
+  <p:timing>
+    <p:tnLst>
+      <p:par>
+        <p:cTn id="1" dur="indefinite" restart="never" nodeType="tmRoot"/>
+      </p:par>
+    </p:tnLst>
+  </p:timing>
 </p:sld>
 </file>
 
@@ -18879,6 +18815,13 @@
   <p:clrMapOvr>
     <a:masterClrMapping/>
   </p:clrMapOvr>
+  <p:timing>
+    <p:tnLst>
+      <p:par>
+        <p:cTn id="1" dur="indefinite" restart="never" nodeType="tmRoot"/>
+      </p:par>
+    </p:tnLst>
+  </p:timing>
 </p:sld>
 </file>
 
@@ -18923,11 +18866,7 @@
           <a:p>
             <a:r>
               <a:rPr lang="en-US" sz="6000" dirty="0" smtClean="0"/>
-              <a:t>Intro – CVSS </a:t>
-            </a:r>
-            <a:r>
-              <a:rPr lang="en-US" sz="6000" dirty="0" smtClean="0"/>
-              <a:t>Score Prediction</a:t>
+              <a:t>Intro – CVSS Score Prediction</a:t>
             </a:r>
             <a:endParaRPr lang="en-CA" dirty="0"/>
           </a:p>
@@ -18991,6 +18930,13 @@
   <p:clrMapOvr>
     <a:masterClrMapping/>
   </p:clrMapOvr>
+  <p:timing>
+    <p:tnLst>
+      <p:par>
+        <p:cTn id="1" dur="indefinite" restart="never" nodeType="tmRoot"/>
+      </p:par>
+    </p:tnLst>
+  </p:timing>
 </p:sld>
 </file>
 
@@ -19065,13 +19011,8 @@
           <a:p>
             <a:r>
               <a:rPr lang="en-US" sz="3600" dirty="0" smtClean="0"/>
-              <a:t>Base scores not correlated with exploits </a:t>
-            </a:r>
-            <a:r>
-              <a:rPr lang="en-US" sz="3600" dirty="0" smtClean="0"/>
-              <a:t>[4,5]</a:t>
-            </a:r>
-            <a:endParaRPr lang="en-US" sz="3600" dirty="0" smtClean="0"/>
+              <a:t>Base scores not correlated with exploits [4,5]</a:t>
+            </a:r>
           </a:p>
           <a:p>
             <a:r>
@@ -19719,6 +19660,13 @@
   <p:clrMapOvr>
     <a:masterClrMapping/>
   </p:clrMapOvr>
+  <p:timing>
+    <p:tnLst>
+      <p:par>
+        <p:cTn id="1" dur="indefinite" restart="never" nodeType="tmRoot"/>
+      </p:par>
+    </p:tnLst>
+  </p:timing>
 </p:sld>
 </file>
 

</xml_diff>